<commit_message>
Update 20200423 OGC API Tiles Sprint Day 1.pptx
</commit_message>
<xml_diff>
--- a/Presentations/20200423 OGC API Tiles Sprint Day 1.pptx
+++ b/Presentations/20200423 OGC API Tiles Sprint Day 1.pptx
@@ -8335,10 +8335,10 @@
       </p:sp>
       <p:pic>
         <p:nvPicPr>
-          <p:cNvPr id="7" name="Picture 6" descr="A screenshot of a cell phone&#10;&#10;Description automatically generated">
+          <p:cNvPr id="5" name="Picture 4" descr="A screenshot of a cell phone&#10;&#10;Description automatically generated">
             <a:extLst>
               <a:ext uri="{FF2B5EF4-FFF2-40B4-BE49-F238E27FC236}">
-                <a16:creationId xmlns:a16="http://schemas.microsoft.com/office/drawing/2014/main" id="{7E45876F-D24D-D04B-A118-98C1EACF05C9}"/>
+                <a16:creationId xmlns:a16="http://schemas.microsoft.com/office/drawing/2014/main" id="{039D4972-8CDF-FA4D-9E78-148C89120DBB}"/>
               </a:ext>
             </a:extLst>
           </p:cNvPr>
@@ -8361,8 +8361,8 @@
         </p:blipFill>
         <p:spPr>
           <a:xfrm>
-            <a:off x="2133600" y="906628"/>
-            <a:ext cx="7770312" cy="5943489"/>
+            <a:off x="685800" y="884396"/>
+            <a:ext cx="11296650" cy="5313203"/>
           </a:xfrm>
           <a:prstGeom prst="rect">
             <a:avLst/>
@@ -8944,10 +8944,10 @@
       </p:sp>
       <p:pic>
         <p:nvPicPr>
-          <p:cNvPr id="7" name="Picture 6" descr="A screenshot of a cell phone&#10;&#10;Description automatically generated">
+          <p:cNvPr id="5" name="Picture 4" descr="A screenshot of a cell phone&#10;&#10;Description automatically generated">
             <a:extLst>
               <a:ext uri="{FF2B5EF4-FFF2-40B4-BE49-F238E27FC236}">
-                <a16:creationId xmlns:a16="http://schemas.microsoft.com/office/drawing/2014/main" id="{7E45876F-D24D-D04B-A118-98C1EACF05C9}"/>
+                <a16:creationId xmlns:a16="http://schemas.microsoft.com/office/drawing/2014/main" id="{14D06BE2-96AC-C646-934D-41F09452B932}"/>
               </a:ext>
             </a:extLst>
           </p:cNvPr>
@@ -8970,8 +8970,8 @@
         </p:blipFill>
         <p:spPr>
           <a:xfrm>
-            <a:off x="2133600" y="906628"/>
-            <a:ext cx="7770312" cy="5943489"/>
+            <a:off x="762000" y="920236"/>
+            <a:ext cx="11220450" cy="5277364"/>
           </a:xfrm>
           <a:prstGeom prst="rect">
             <a:avLst/>

</xml_diff>